<commit_message>
Added qrcode to kubernetes on azure
</commit_message>
<xml_diff>
--- a/Kubernetes on Azure.pptx
+++ b/Kubernetes on Azure.pptx
@@ -5,7 +5,7 @@
     <p:sldMasterId id="2147483648" r:id="rId4"/>
   </p:sldMasterIdLst>
   <p:notesMasterIdLst>
-    <p:notesMasterId r:id="rId24"/>
+    <p:notesMasterId r:id="rId25"/>
   </p:notesMasterIdLst>
   <p:sldIdLst>
     <p:sldId id="256" r:id="rId5"/>
@@ -27,6 +27,7 @@
     <p:sldId id="272" r:id="rId21"/>
     <p:sldId id="273" r:id="rId22"/>
     <p:sldId id="274" r:id="rId23"/>
+    <p:sldId id="276" r:id="rId24"/>
   </p:sldIdLst>
   <p:sldSz cx="12192000" cy="6858000"/>
   <p:notesSz cx="6858000" cy="9144000"/>
@@ -143,14 +144,6 @@
     </p:extLst>
   </p:cmAuthor>
 </p:cmAuthorLst>
-</file>
-
-<file path=ppt/revisionInfo.xml><?xml version="1.0" encoding="utf-8"?>
-<p1510:revInfo xmlns:a="http://schemas.openxmlformats.org/drawingml/2006/main" xmlns:r="http://schemas.openxmlformats.org/officeDocument/2006/relationships" xmlns:p1510="http://schemas.microsoft.com/office/powerpoint/2015/10/main">
-  <p1510:revLst>
-    <p1510:client id="{B3722B24-DCCF-4A7E-B51C-F489845BB786}" v="102" dt="2020-02-12T16:42:11.152"/>
-  </p1510:revLst>
-</p1510:revInfo>
 </file>
 
 <file path=ppt/diagrams/colors1.xml><?xml version="1.0" encoding="utf-8"?>
@@ -19048,6 +19041,148 @@
 </p:sld>
 </file>
 
+<file path=ppt/slides/slide20.xml><?xml version="1.0" encoding="utf-8"?>
+<p:sld xmlns:a="http://schemas.openxmlformats.org/drawingml/2006/main" xmlns:r="http://schemas.openxmlformats.org/officeDocument/2006/relationships" xmlns:p="http://schemas.openxmlformats.org/presentationml/2006/main">
+  <p:cSld>
+    <p:bg>
+      <p:bgPr>
+        <a:gradFill rotWithShape="1">
+          <a:gsLst>
+            <a:gs pos="10000">
+              <a:schemeClr val="bg1">
+                <a:tint val="97000"/>
+                <a:hueMod val="92000"/>
+                <a:satMod val="169000"/>
+                <a:lumMod val="164000"/>
+              </a:schemeClr>
+            </a:gs>
+            <a:gs pos="100000">
+              <a:schemeClr val="bg1">
+                <a:shade val="96000"/>
+                <a:satMod val="120000"/>
+                <a:lumMod val="90000"/>
+              </a:schemeClr>
+            </a:gs>
+          </a:gsLst>
+          <a:lin ang="6120000" scaled="1"/>
+        </a:gradFill>
+        <a:effectLst/>
+      </p:bgPr>
+    </p:bg>
+    <p:spTree>
+      <p:nvGrpSpPr>
+        <p:cNvPr id="1" name=""/>
+        <p:cNvGrpSpPr/>
+        <p:nvPr/>
+      </p:nvGrpSpPr>
+      <p:grpSpPr>
+        <a:xfrm>
+          <a:off x="0" y="0"/>
+          <a:ext cx="0" cy="0"/>
+          <a:chOff x="0" y="0"/>
+          <a:chExt cx="0" cy="0"/>
+        </a:xfrm>
+      </p:grpSpPr>
+      <p:sp>
+        <p:nvSpPr>
+          <p:cNvPr id="2" name="Title 1">
+            <a:extLst>
+              <a:ext uri="{FF2B5EF4-FFF2-40B4-BE49-F238E27FC236}">
+                <a16:creationId xmlns:a16="http://schemas.microsoft.com/office/drawing/2014/main" id="{75584269-A111-4A41-B7DF-36B97B330D25}"/>
+              </a:ext>
+            </a:extLst>
+          </p:cNvPr>
+          <p:cNvSpPr>
+            <a:spLocks noGrp="1"/>
+          </p:cNvSpPr>
+          <p:nvPr>
+            <p:ph type="title"/>
+          </p:nvPr>
+        </p:nvSpPr>
+        <p:spPr>
+          <a:xfrm>
+            <a:off x="5135754" y="628617"/>
+            <a:ext cx="6368858" cy="3028983"/>
+          </a:xfrm>
+        </p:spPr>
+        <p:txBody>
+          <a:bodyPr vert="horz" lIns="91440" tIns="45720" rIns="91440" bIns="45720" rtlCol="0" anchor="b">
+            <a:normAutofit/>
+          </a:bodyPr>
+          <a:lstStyle/>
+          <a:p>
+            <a:r>
+              <a:rPr lang="en-US" sz="4800"/>
+              <a:t>Link to slides</a:t>
+            </a:r>
+          </a:p>
+        </p:txBody>
+      </p:sp>
+      <p:pic>
+        <p:nvPicPr>
+          <p:cNvPr id="5" name="Content Placeholder 4">
+            <a:extLst>
+              <a:ext uri="{FF2B5EF4-FFF2-40B4-BE49-F238E27FC236}">
+                <a16:creationId xmlns:a16="http://schemas.microsoft.com/office/drawing/2014/main" id="{CEBC11E5-62CF-49D0-8C1D-7F0FD1C2B7A3}"/>
+              </a:ext>
+            </a:extLst>
+          </p:cNvPr>
+          <p:cNvPicPr>
+            <a:picLocks noGrp="1" noChangeAspect="1"/>
+          </p:cNvPicPr>
+          <p:nvPr>
+            <p:ph idx="1"/>
+          </p:nvPr>
+        </p:nvPicPr>
+        <p:blipFill>
+          <a:blip r:embed="rId3">
+            <a:extLst>
+              <a:ext uri="{96DAC541-7B7A-43D3-8B79-37D633B846F1}">
+                <asvg:svgBlip xmlns:asvg="http://schemas.microsoft.com/office/drawing/2016/SVG/main" r:embed="rId4"/>
+              </a:ext>
+            </a:extLst>
+          </a:blip>
+          <a:stretch>
+            <a:fillRect/>
+          </a:stretch>
+        </p:blipFill>
+        <p:spPr>
+          <a:xfrm>
+            <a:off x="646633" y="1264416"/>
+            <a:ext cx="4004489" cy="4004489"/>
+          </a:xfrm>
+          <a:prstGeom prst="rect">
+            <a:avLst/>
+          </a:prstGeom>
+          <a:ln w="15875">
+            <a:solidFill>
+              <a:srgbClr val="FFFFFF">
+                <a:alpha val="40000"/>
+              </a:srgbClr>
+            </a:solidFill>
+          </a:ln>
+          <a:effectLst>
+            <a:innerShdw blurRad="57150" dist="38100" dir="14460000">
+              <a:prstClr val="black">
+                <a:alpha val="70000"/>
+              </a:prstClr>
+            </a:innerShdw>
+          </a:effectLst>
+        </p:spPr>
+      </p:pic>
+    </p:spTree>
+    <p:extLst>
+      <p:ext uri="{BB962C8B-B14F-4D97-AF65-F5344CB8AC3E}">
+        <p14:creationId xmlns:p14="http://schemas.microsoft.com/office/powerpoint/2010/main" val="724239154"/>
+      </p:ext>
+    </p:extLst>
+  </p:cSld>
+  <p:clrMapOvr>
+    <a:overrideClrMapping bg1="dk1" tx1="lt1" bg2="dk2" tx2="lt2" accent1="accent1" accent2="accent2" accent3="accent3" accent4="accent4" accent5="accent5" accent6="accent6" hlink="hlink" folHlink="folHlink"/>
+  </p:clrMapOvr>
+</p:sld>
+</file>
+
 <file path=ppt/slides/slide3.xml><?xml version="1.0" encoding="utf-8"?>
 <p:sld xmlns:a="http://schemas.openxmlformats.org/drawingml/2006/main" xmlns:r="http://schemas.openxmlformats.org/officeDocument/2006/relationships" xmlns:p="http://schemas.openxmlformats.org/presentationml/2006/main">
   <p:cSld>
@@ -23310,6 +23445,49 @@
 </a:themeOverride>
 </file>
 
+<file path=ppt/theme/themeOverride10.xml><?xml version="1.0" encoding="utf-8"?>
+<a:themeOverride xmlns:a="http://schemas.openxmlformats.org/drawingml/2006/main">
+  <a:clrScheme name="Slice">
+    <a:dk1>
+      <a:sysClr val="windowText" lastClr="000000"/>
+    </a:dk1>
+    <a:lt1>
+      <a:sysClr val="window" lastClr="FFFFFF"/>
+    </a:lt1>
+    <a:dk2>
+      <a:srgbClr val="146194"/>
+    </a:dk2>
+    <a:lt2>
+      <a:srgbClr val="76DBF4"/>
+    </a:lt2>
+    <a:accent1>
+      <a:srgbClr val="052F61"/>
+    </a:accent1>
+    <a:accent2>
+      <a:srgbClr val="A50E82"/>
+    </a:accent2>
+    <a:accent3>
+      <a:srgbClr val="14967C"/>
+    </a:accent3>
+    <a:accent4>
+      <a:srgbClr val="6A9E1F"/>
+    </a:accent4>
+    <a:accent5>
+      <a:srgbClr val="E87D37"/>
+    </a:accent5>
+    <a:accent6>
+      <a:srgbClr val="C62324"/>
+    </a:accent6>
+    <a:hlink>
+      <a:srgbClr val="0D2E46"/>
+    </a:hlink>
+    <a:folHlink>
+      <a:srgbClr val="356A95"/>
+    </a:folHlink>
+  </a:clrScheme>
+</a:themeOverride>
+</file>
+
 <file path=ppt/theme/themeOverride2.xml><?xml version="1.0" encoding="utf-8"?>
 <a:themeOverride xmlns:a="http://schemas.openxmlformats.org/drawingml/2006/main">
   <a:clrScheme name="Slice">

</xml_diff>